<commit_message>
Laid down the groundwork for the basic layout.
For now, is going to match ppt doc entirely, will be tweaked
when placed in main document to match default styling.
</commit_message>
<xml_diff>
--- a/newUI/newUI.pptx
+++ b/newUI/newUI.pptx
@@ -109,7 +109,18 @@
   </p:defaultTextStyle>
   <p:extLst>
     <p:ext uri="{EFAFB233-063F-42B5-8137-9DF3F51BA10A}">
-      <p15:sldGuideLst xmlns:p15="http://schemas.microsoft.com/office/powerpoint/2012/main"/>
+      <p15:sldGuideLst xmlns:p15="http://schemas.microsoft.com/office/powerpoint/2012/main">
+        <p15:guide id="1" orient="horz" pos="2160" userDrawn="1">
+          <p15:clr>
+            <a:srgbClr val="A4A3A4"/>
+          </p15:clr>
+        </p15:guide>
+        <p15:guide id="2" pos="3840" userDrawn="1">
+          <p15:clr>
+            <a:srgbClr val="A4A3A4"/>
+          </p15:clr>
+        </p15:guide>
+      </p15:sldGuideLst>
     </p:ext>
   </p:extLst>
 </p:presentation>

</xml_diff>

<commit_message>
Continued to work on newUI stuff.
Layout is starting to come together.
Just need the basic css sorted out, and then
to write the rest of the html tabs.
</commit_message>
<xml_diff>
--- a/newUI/newUI.pptx
+++ b/newUI/newUI.pptx
@@ -275,7 +275,7 @@
           <a:p>
             <a:fld id="{2C621247-2685-4091-9EAF-E362E4D1BA7A}" type="datetimeFigureOut">
               <a:rPr lang="en-GB" smtClean="0"/>
-              <a:t>14/02/2025</a:t>
+              <a:t>15/02/2025</a:t>
             </a:fld>
             <a:endParaRPr lang="en-GB"/>
           </a:p>
@@ -475,7 +475,7 @@
           <a:p>
             <a:fld id="{2C621247-2685-4091-9EAF-E362E4D1BA7A}" type="datetimeFigureOut">
               <a:rPr lang="en-GB" smtClean="0"/>
-              <a:t>14/02/2025</a:t>
+              <a:t>15/02/2025</a:t>
             </a:fld>
             <a:endParaRPr lang="en-GB"/>
           </a:p>
@@ -685,7 +685,7 @@
           <a:p>
             <a:fld id="{2C621247-2685-4091-9EAF-E362E4D1BA7A}" type="datetimeFigureOut">
               <a:rPr lang="en-GB" smtClean="0"/>
-              <a:t>14/02/2025</a:t>
+              <a:t>15/02/2025</a:t>
             </a:fld>
             <a:endParaRPr lang="en-GB"/>
           </a:p>
@@ -885,7 +885,7 @@
           <a:p>
             <a:fld id="{2C621247-2685-4091-9EAF-E362E4D1BA7A}" type="datetimeFigureOut">
               <a:rPr lang="en-GB" smtClean="0"/>
-              <a:t>14/02/2025</a:t>
+              <a:t>15/02/2025</a:t>
             </a:fld>
             <a:endParaRPr lang="en-GB"/>
           </a:p>
@@ -1161,7 +1161,7 @@
           <a:p>
             <a:fld id="{2C621247-2685-4091-9EAF-E362E4D1BA7A}" type="datetimeFigureOut">
               <a:rPr lang="en-GB" smtClean="0"/>
-              <a:t>14/02/2025</a:t>
+              <a:t>15/02/2025</a:t>
             </a:fld>
             <a:endParaRPr lang="en-GB"/>
           </a:p>
@@ -1429,7 +1429,7 @@
           <a:p>
             <a:fld id="{2C621247-2685-4091-9EAF-E362E4D1BA7A}" type="datetimeFigureOut">
               <a:rPr lang="en-GB" smtClean="0"/>
-              <a:t>14/02/2025</a:t>
+              <a:t>15/02/2025</a:t>
             </a:fld>
             <a:endParaRPr lang="en-GB"/>
           </a:p>
@@ -1844,7 +1844,7 @@
           <a:p>
             <a:fld id="{2C621247-2685-4091-9EAF-E362E4D1BA7A}" type="datetimeFigureOut">
               <a:rPr lang="en-GB" smtClean="0"/>
-              <a:t>14/02/2025</a:t>
+              <a:t>15/02/2025</a:t>
             </a:fld>
             <a:endParaRPr lang="en-GB"/>
           </a:p>
@@ -1986,7 +1986,7 @@
           <a:p>
             <a:fld id="{2C621247-2685-4091-9EAF-E362E4D1BA7A}" type="datetimeFigureOut">
               <a:rPr lang="en-GB" smtClean="0"/>
-              <a:t>14/02/2025</a:t>
+              <a:t>15/02/2025</a:t>
             </a:fld>
             <a:endParaRPr lang="en-GB"/>
           </a:p>
@@ -2099,7 +2099,7 @@
           <a:p>
             <a:fld id="{2C621247-2685-4091-9EAF-E362E4D1BA7A}" type="datetimeFigureOut">
               <a:rPr lang="en-GB" smtClean="0"/>
-              <a:t>14/02/2025</a:t>
+              <a:t>15/02/2025</a:t>
             </a:fld>
             <a:endParaRPr lang="en-GB"/>
           </a:p>
@@ -2412,7 +2412,7 @@
           <a:p>
             <a:fld id="{2C621247-2685-4091-9EAF-E362E4D1BA7A}" type="datetimeFigureOut">
               <a:rPr lang="en-GB" smtClean="0"/>
-              <a:t>14/02/2025</a:t>
+              <a:t>15/02/2025</a:t>
             </a:fld>
             <a:endParaRPr lang="en-GB"/>
           </a:p>
@@ -2701,7 +2701,7 @@
           <a:p>
             <a:fld id="{2C621247-2685-4091-9EAF-E362E4D1BA7A}" type="datetimeFigureOut">
               <a:rPr lang="en-GB" smtClean="0"/>
-              <a:t>14/02/2025</a:t>
+              <a:t>15/02/2025</a:t>
             </a:fld>
             <a:endParaRPr lang="en-GB"/>
           </a:p>
@@ -2944,7 +2944,7 @@
           <a:p>
             <a:fld id="{2C621247-2685-4091-9EAF-E362E4D1BA7A}" type="datetimeFigureOut">
               <a:rPr lang="en-GB" smtClean="0"/>
-              <a:t>14/02/2025</a:t>
+              <a:t>15/02/2025</a:t>
             </a:fld>
             <a:endParaRPr lang="en-GB"/>
           </a:p>

</xml_diff>

<commit_message>
Continued to add to and tweak the newUI concept.
CSS is a bit messy with lots of small size and
margin adjustments but hey.
</commit_message>
<xml_diff>
--- a/newUI/newUI.pptx
+++ b/newUI/newUI.pptx
@@ -3569,7 +3569,7 @@
           <a:prstGeom prst="rect">
             <a:avLst/>
           </a:prstGeom>
-          <a:ln w="15875"/>
+          <a:ln/>
         </p:spPr>
         <p:style>
           <a:lnRef idx="2">
@@ -7320,7 +7320,7 @@
   <a:themeElements>
     <a:clrScheme name="lewd">
       <a:dk1>
-        <a:sysClr val="windowText" lastClr="5F616C"/>
+        <a:sysClr val="windowText" lastClr="000000"/>
       </a:dk1>
       <a:lt1>
         <a:sysClr val="window" lastClr="FFFFFF"/>

</xml_diff>

<commit_message>
just more added :p
</commit_message>
<xml_diff>
--- a/newUI/newUI.pptx
+++ b/newUI/newUI.pptx
@@ -4401,49 +4401,6 @@
           </a:p>
         </p:txBody>
       </p:sp>
-      <p:cxnSp>
-        <p:nvCxnSpPr>
-          <p:cNvPr id="30" name="Straight Connector 29">
-            <a:extLst>
-              <a:ext uri="{FF2B5EF4-FFF2-40B4-BE49-F238E27FC236}">
-                <a16:creationId xmlns:a16="http://schemas.microsoft.com/office/drawing/2014/main" id="{5FA1F70B-1A0C-EE8B-7EB8-FA40BFD0FF03}"/>
-              </a:ext>
-            </a:extLst>
-          </p:cNvPr>
-          <p:cNvCxnSpPr>
-            <a:cxnSpLocks/>
-          </p:cNvCxnSpPr>
-          <p:nvPr/>
-        </p:nvCxnSpPr>
-        <p:spPr>
-          <a:xfrm>
-            <a:off x="4798421" y="4551959"/>
-            <a:ext cx="5448572" cy="0"/>
-          </a:xfrm>
-          <a:prstGeom prst="line">
-            <a:avLst/>
-          </a:prstGeom>
-          <a:ln>
-            <a:solidFill>
-              <a:schemeClr val="bg2"/>
-            </a:solidFill>
-          </a:ln>
-        </p:spPr>
-        <p:style>
-          <a:lnRef idx="1">
-            <a:schemeClr val="accent1"/>
-          </a:lnRef>
-          <a:fillRef idx="0">
-            <a:schemeClr val="accent1"/>
-          </a:fillRef>
-          <a:effectRef idx="0">
-            <a:schemeClr val="accent1"/>
-          </a:effectRef>
-          <a:fontRef idx="minor">
-            <a:schemeClr val="tx1"/>
-          </a:fontRef>
-        </p:style>
-      </p:cxnSp>
     </p:spTree>
     <p:extLst>
       <p:ext uri="{BB962C8B-B14F-4D97-AF65-F5344CB8AC3E}">
@@ -5160,49 +5117,6 @@
           </a:p>
         </p:txBody>
       </p:sp>
-      <p:cxnSp>
-        <p:nvCxnSpPr>
-          <p:cNvPr id="30" name="Straight Connector 29">
-            <a:extLst>
-              <a:ext uri="{FF2B5EF4-FFF2-40B4-BE49-F238E27FC236}">
-                <a16:creationId xmlns:a16="http://schemas.microsoft.com/office/drawing/2014/main" id="{6B4B957A-4753-461E-61E4-7C084CD6DF6D}"/>
-              </a:ext>
-            </a:extLst>
-          </p:cNvPr>
-          <p:cNvCxnSpPr>
-            <a:cxnSpLocks/>
-          </p:cNvCxnSpPr>
-          <p:nvPr/>
-        </p:nvCxnSpPr>
-        <p:spPr>
-          <a:xfrm>
-            <a:off x="4818834" y="3169919"/>
-            <a:ext cx="5448572" cy="0"/>
-          </a:xfrm>
-          <a:prstGeom prst="line">
-            <a:avLst/>
-          </a:prstGeom>
-          <a:ln>
-            <a:solidFill>
-              <a:schemeClr val="bg2"/>
-            </a:solidFill>
-          </a:ln>
-        </p:spPr>
-        <p:style>
-          <a:lnRef idx="1">
-            <a:schemeClr val="accent1"/>
-          </a:lnRef>
-          <a:fillRef idx="0">
-            <a:schemeClr val="accent1"/>
-          </a:fillRef>
-          <a:effectRef idx="0">
-            <a:schemeClr val="accent1"/>
-          </a:effectRef>
-          <a:fontRef idx="minor">
-            <a:schemeClr val="tx1"/>
-          </a:fontRef>
-        </p:style>
-      </p:cxnSp>
       <p:sp>
         <p:nvSpPr>
           <p:cNvPr id="2" name="Rectangle 1">

</xml_diff>

<commit_message>
Finished (ish) second page.
also small patch to main script, oopsies.
</commit_message>
<xml_diff>
--- a/newUI/newUI.pptx
+++ b/newUI/newUI.pptx
@@ -3381,6 +3381,9 @@
           <a:prstGeom prst="rect">
             <a:avLst/>
           </a:prstGeom>
+          <a:solidFill>
+            <a:schemeClr val="tx2"/>
+          </a:solidFill>
         </p:spPr>
         <p:style>
           <a:lnRef idx="2">
@@ -4457,6 +4460,9 @@
           <a:prstGeom prst="rect">
             <a:avLst/>
           </a:prstGeom>
+          <a:solidFill>
+            <a:schemeClr val="tx2"/>
+          </a:solidFill>
         </p:spPr>
         <p:style>
           <a:lnRef idx="2">
@@ -5385,7 +5391,7 @@
         </p:nvSpPr>
         <p:spPr>
           <a:xfrm>
-            <a:off x="7226824" y="5268980"/>
+            <a:off x="7226824" y="5278311"/>
             <a:ext cx="3013089" cy="360823"/>
           </a:xfrm>
           <a:prstGeom prst="rect">
@@ -5483,7 +5489,7 @@
         </p:nvSpPr>
         <p:spPr>
           <a:xfrm>
-            <a:off x="9018810" y="5072628"/>
+            <a:off x="9018810" y="5081959"/>
             <a:ext cx="1950730" cy="369332"/>
           </a:xfrm>
           <a:prstGeom prst="rect">
@@ -5574,7 +5580,7 @@
         </p:nvSpPr>
         <p:spPr>
           <a:xfrm>
-            <a:off x="7226824" y="5792327"/>
+            <a:off x="7226824" y="5801658"/>
             <a:ext cx="3013089" cy="360823"/>
           </a:xfrm>
           <a:prstGeom prst="rect">
@@ -5672,7 +5678,7 @@
         </p:nvSpPr>
         <p:spPr>
           <a:xfrm>
-            <a:off x="8802453" y="5602726"/>
+            <a:off x="8802453" y="5612057"/>
             <a:ext cx="1950730" cy="369332"/>
           </a:xfrm>
           <a:prstGeom prst="rect">
@@ -5931,6 +5937,9 @@
           <a:prstGeom prst="rect">
             <a:avLst/>
           </a:prstGeom>
+          <a:solidFill>
+            <a:schemeClr val="tx2"/>
+          </a:solidFill>
         </p:spPr>
         <p:style>
           <a:lnRef idx="2">
@@ -6520,6 +6529,9 @@
           <a:prstGeom prst="rect">
             <a:avLst/>
           </a:prstGeom>
+          <a:solidFill>
+            <a:schemeClr val="tx2"/>
+          </a:solidFill>
         </p:spPr>
         <p:style>
           <a:lnRef idx="2">

</xml_diff>

<commit_message>
newUI concept is pretty much complete.
Have to plug it into the main script now.
</commit_message>
<xml_diff>
--- a/newUI/newUI.pptx
+++ b/newUI/newUI.pptx
@@ -275,7 +275,7 @@
           <a:p>
             <a:fld id="{2C621247-2685-4091-9EAF-E362E4D1BA7A}" type="datetimeFigureOut">
               <a:rPr lang="en-GB" smtClean="0"/>
-              <a:t>15/02/2025</a:t>
+              <a:t>17/02/2025</a:t>
             </a:fld>
             <a:endParaRPr lang="en-GB"/>
           </a:p>
@@ -475,7 +475,7 @@
           <a:p>
             <a:fld id="{2C621247-2685-4091-9EAF-E362E4D1BA7A}" type="datetimeFigureOut">
               <a:rPr lang="en-GB" smtClean="0"/>
-              <a:t>15/02/2025</a:t>
+              <a:t>17/02/2025</a:t>
             </a:fld>
             <a:endParaRPr lang="en-GB"/>
           </a:p>
@@ -685,7 +685,7 @@
           <a:p>
             <a:fld id="{2C621247-2685-4091-9EAF-E362E4D1BA7A}" type="datetimeFigureOut">
               <a:rPr lang="en-GB" smtClean="0"/>
-              <a:t>15/02/2025</a:t>
+              <a:t>17/02/2025</a:t>
             </a:fld>
             <a:endParaRPr lang="en-GB"/>
           </a:p>
@@ -885,7 +885,7 @@
           <a:p>
             <a:fld id="{2C621247-2685-4091-9EAF-E362E4D1BA7A}" type="datetimeFigureOut">
               <a:rPr lang="en-GB" smtClean="0"/>
-              <a:t>15/02/2025</a:t>
+              <a:t>17/02/2025</a:t>
             </a:fld>
             <a:endParaRPr lang="en-GB"/>
           </a:p>
@@ -1161,7 +1161,7 @@
           <a:p>
             <a:fld id="{2C621247-2685-4091-9EAF-E362E4D1BA7A}" type="datetimeFigureOut">
               <a:rPr lang="en-GB" smtClean="0"/>
-              <a:t>15/02/2025</a:t>
+              <a:t>17/02/2025</a:t>
             </a:fld>
             <a:endParaRPr lang="en-GB"/>
           </a:p>
@@ -1429,7 +1429,7 @@
           <a:p>
             <a:fld id="{2C621247-2685-4091-9EAF-E362E4D1BA7A}" type="datetimeFigureOut">
               <a:rPr lang="en-GB" smtClean="0"/>
-              <a:t>15/02/2025</a:t>
+              <a:t>17/02/2025</a:t>
             </a:fld>
             <a:endParaRPr lang="en-GB"/>
           </a:p>
@@ -1844,7 +1844,7 @@
           <a:p>
             <a:fld id="{2C621247-2685-4091-9EAF-E362E4D1BA7A}" type="datetimeFigureOut">
               <a:rPr lang="en-GB" smtClean="0"/>
-              <a:t>15/02/2025</a:t>
+              <a:t>17/02/2025</a:t>
             </a:fld>
             <a:endParaRPr lang="en-GB"/>
           </a:p>
@@ -1986,7 +1986,7 @@
           <a:p>
             <a:fld id="{2C621247-2685-4091-9EAF-E362E4D1BA7A}" type="datetimeFigureOut">
               <a:rPr lang="en-GB" smtClean="0"/>
-              <a:t>15/02/2025</a:t>
+              <a:t>17/02/2025</a:t>
             </a:fld>
             <a:endParaRPr lang="en-GB"/>
           </a:p>
@@ -2099,7 +2099,7 @@
           <a:p>
             <a:fld id="{2C621247-2685-4091-9EAF-E362E4D1BA7A}" type="datetimeFigureOut">
               <a:rPr lang="en-GB" smtClean="0"/>
-              <a:t>15/02/2025</a:t>
+              <a:t>17/02/2025</a:t>
             </a:fld>
             <a:endParaRPr lang="en-GB"/>
           </a:p>
@@ -2412,7 +2412,7 @@
           <a:p>
             <a:fld id="{2C621247-2685-4091-9EAF-E362E4D1BA7A}" type="datetimeFigureOut">
               <a:rPr lang="en-GB" smtClean="0"/>
-              <a:t>15/02/2025</a:t>
+              <a:t>17/02/2025</a:t>
             </a:fld>
             <a:endParaRPr lang="en-GB"/>
           </a:p>
@@ -2701,7 +2701,7 @@
           <a:p>
             <a:fld id="{2C621247-2685-4091-9EAF-E362E4D1BA7A}" type="datetimeFigureOut">
               <a:rPr lang="en-GB" smtClean="0"/>
-              <a:t>15/02/2025</a:t>
+              <a:t>17/02/2025</a:t>
             </a:fld>
             <a:endParaRPr lang="en-GB"/>
           </a:p>
@@ -2944,7 +2944,7 @@
           <a:p>
             <a:fld id="{2C621247-2685-4091-9EAF-E362E4D1BA7A}" type="datetimeFigureOut">
               <a:rPr lang="en-GB" smtClean="0"/>
-              <a:t>15/02/2025</a:t>
+              <a:t>17/02/2025</a:t>
             </a:fld>
             <a:endParaRPr lang="en-GB"/>
           </a:p>

</xml_diff>